<commit_message>
Apresentação e exclusao virtual de turmas
</commit_message>
<xml_diff>
--- a/RSNUG6.pptx
+++ b/RSNUG6.pptx
@@ -5,10 +5,10 @@
     <p:sldMasterId id="2147483648" r:id="rId4"/>
   </p:sldMasterIdLst>
   <p:notesMasterIdLst>
-    <p:notesMasterId r:id="rId23"/>
+    <p:notesMasterId r:id="rId22"/>
   </p:notesMasterIdLst>
   <p:handoutMasterIdLst>
-    <p:handoutMasterId r:id="rId24"/>
+    <p:handoutMasterId r:id="rId23"/>
   </p:handoutMasterIdLst>
   <p:sldIdLst>
     <p:sldId id="286" r:id="rId5"/>
@@ -18,17 +18,16 @@
     <p:sldId id="357" r:id="rId9"/>
     <p:sldId id="354" r:id="rId10"/>
     <p:sldId id="358" r:id="rId11"/>
-    <p:sldId id="359" r:id="rId12"/>
-    <p:sldId id="360" r:id="rId13"/>
-    <p:sldId id="362" r:id="rId14"/>
-    <p:sldId id="363" r:id="rId15"/>
-    <p:sldId id="364" r:id="rId16"/>
-    <p:sldId id="365" r:id="rId17"/>
-    <p:sldId id="366" r:id="rId18"/>
-    <p:sldId id="367" r:id="rId19"/>
-    <p:sldId id="368" r:id="rId20"/>
-    <p:sldId id="361" r:id="rId21"/>
-    <p:sldId id="351" r:id="rId22"/>
+    <p:sldId id="362" r:id="rId12"/>
+    <p:sldId id="363" r:id="rId13"/>
+    <p:sldId id="364" r:id="rId14"/>
+    <p:sldId id="365" r:id="rId15"/>
+    <p:sldId id="366" r:id="rId16"/>
+    <p:sldId id="367" r:id="rId17"/>
+    <p:sldId id="368" r:id="rId18"/>
+    <p:sldId id="369" r:id="rId19"/>
+    <p:sldId id="361" r:id="rId20"/>
+    <p:sldId id="351" r:id="rId21"/>
   </p:sldIdLst>
   <p:sldSz cx="12192000" cy="6858000"/>
   <p:notesSz cx="6858000" cy="9144000"/>
@@ -926,7 +925,7 @@
           <a:p>
             <a:fld id="{D6472B77-DCEF-434C-81B9-C3E8838E6C9A}" type="slidenum">
               <a:rPr lang="en-US" smtClean="0"/>
-              <a:t>18</a:t>
+              <a:t>17</a:t>
             </a:fld>
             <a:endParaRPr lang="en-US"/>
           </a:p>
@@ -20233,16 +20232,13 @@
                   <a:schemeClr val="bg1"/>
                 </a:solidFill>
               </a:rPr>
-              <a:t>Exemplos com </a:t>
-            </a:r>
-            <a:r>
-              <a:rPr lang="pt-BR" sz="5400" b="1" dirty="0">
-                <a:solidFill>
-                  <a:srgbClr val="FFFF00"/>
-                </a:solidFill>
-              </a:rPr>
-              <a:t>EF-CORE (3.x)</a:t>
-            </a:r>
+              <a:t>Exemplos</a:t>
+            </a:r>
+            <a:endParaRPr lang="pt-BR" sz="5400" b="1" dirty="0">
+              <a:solidFill>
+                <a:srgbClr val="FFFF00"/>
+              </a:solidFill>
+            </a:endParaRPr>
           </a:p>
         </p:txBody>
       </p:sp>
@@ -20322,10 +20318,98 @@
           </a:p>
         </p:txBody>
       </p:sp>
+      <p:sp>
+        <p:nvSpPr>
+          <p:cNvPr id="5" name="CaixaDeTexto 4">
+            <a:extLst>
+              <a:ext uri="{FF2B5EF4-FFF2-40B4-BE49-F238E27FC236}">
+                <a16:creationId xmlns:a16="http://schemas.microsoft.com/office/drawing/2014/main" id="{3F6974E5-06E7-4863-AC37-91A20DB741AC}"/>
+              </a:ext>
+            </a:extLst>
+          </p:cNvPr>
+          <p:cNvSpPr txBox="1"/>
+          <p:nvPr/>
+        </p:nvSpPr>
+        <p:spPr>
+          <a:xfrm>
+            <a:off x="912940" y="1834136"/>
+            <a:ext cx="9032439" cy="707886"/>
+          </a:xfrm>
+          <a:prstGeom prst="rect">
+            <a:avLst/>
+          </a:prstGeom>
+          <a:noFill/>
+        </p:spPr>
+        <p:txBody>
+          <a:bodyPr wrap="square" rtlCol="0">
+            <a:spAutoFit/>
+          </a:bodyPr>
+          <a:lstStyle/>
+          <a:p>
+            <a:r>
+              <a:rPr lang="pt-BR" sz="4000" b="1" dirty="0">
+                <a:solidFill>
+                  <a:schemeClr val="bg1"/>
+                </a:solidFill>
+              </a:rPr>
+              <a:t>Mapeando entidades</a:t>
+            </a:r>
+            <a:endParaRPr lang="pt-BR" sz="4000" b="1" i="1" dirty="0">
+              <a:solidFill>
+                <a:srgbClr val="FFFF00"/>
+              </a:solidFill>
+            </a:endParaRPr>
+          </a:p>
+        </p:txBody>
+      </p:sp>
+      <p:sp>
+        <p:nvSpPr>
+          <p:cNvPr id="6" name="CaixaDeTexto 5">
+            <a:extLst>
+              <a:ext uri="{FF2B5EF4-FFF2-40B4-BE49-F238E27FC236}">
+                <a16:creationId xmlns:a16="http://schemas.microsoft.com/office/drawing/2014/main" id="{22FA2AAE-7240-4636-A70A-D2F31F35B5A2}"/>
+              </a:ext>
+            </a:extLst>
+          </p:cNvPr>
+          <p:cNvSpPr txBox="1"/>
+          <p:nvPr/>
+        </p:nvSpPr>
+        <p:spPr>
+          <a:xfrm>
+            <a:off x="912940" y="2542022"/>
+            <a:ext cx="9032439" cy="707886"/>
+          </a:xfrm>
+          <a:prstGeom prst="rect">
+            <a:avLst/>
+          </a:prstGeom>
+          <a:noFill/>
+        </p:spPr>
+        <p:txBody>
+          <a:bodyPr wrap="square" rtlCol="0">
+            <a:spAutoFit/>
+          </a:bodyPr>
+          <a:lstStyle/>
+          <a:p>
+            <a:r>
+              <a:rPr lang="pt-BR" sz="4000" b="1" dirty="0">
+                <a:solidFill>
+                  <a:schemeClr val="bg1"/>
+                </a:solidFill>
+              </a:rPr>
+              <a:t>Mapeando valores de objetos</a:t>
+            </a:r>
+            <a:endParaRPr lang="pt-BR" sz="4000" b="1" i="1" dirty="0">
+              <a:solidFill>
+                <a:srgbClr val="FFFF00"/>
+              </a:solidFill>
+            </a:endParaRPr>
+          </a:p>
+        </p:txBody>
+      </p:sp>
     </p:spTree>
     <p:extLst>
       <p:ext uri="{BB962C8B-B14F-4D97-AF65-F5344CB8AC3E}">
-        <p14:creationId xmlns:p14="http://schemas.microsoft.com/office/powerpoint/2010/main" val="3125934658"/>
+        <p14:creationId xmlns:p14="http://schemas.microsoft.com/office/powerpoint/2010/main" val="1727149459"/>
       </p:ext>
     </p:extLst>
   </p:cSld>
@@ -20421,16 +20505,13 @@
                   <a:schemeClr val="bg1"/>
                 </a:solidFill>
               </a:rPr>
-              <a:t>Exemplos com </a:t>
-            </a:r>
-            <a:r>
-              <a:rPr lang="pt-BR" sz="5400" b="1" dirty="0">
-                <a:solidFill>
-                  <a:srgbClr val="FFFF00"/>
-                </a:solidFill>
-              </a:rPr>
-              <a:t>EF-CORE (3.x)</a:t>
-            </a:r>
+              <a:t>Exemplos</a:t>
+            </a:r>
+            <a:endParaRPr lang="pt-BR" sz="5400" b="1" dirty="0">
+              <a:solidFill>
+                <a:srgbClr val="FFFF00"/>
+              </a:solidFill>
+            </a:endParaRPr>
           </a:p>
         </p:txBody>
       </p:sp>
@@ -20554,10 +20635,98 @@
           </a:p>
         </p:txBody>
       </p:sp>
+      <p:sp>
+        <p:nvSpPr>
+          <p:cNvPr id="6" name="CaixaDeTexto 5">
+            <a:extLst>
+              <a:ext uri="{FF2B5EF4-FFF2-40B4-BE49-F238E27FC236}">
+                <a16:creationId xmlns:a16="http://schemas.microsoft.com/office/drawing/2014/main" id="{22FA2AAE-7240-4636-A70A-D2F31F35B5A2}"/>
+              </a:ext>
+            </a:extLst>
+          </p:cNvPr>
+          <p:cNvSpPr txBox="1"/>
+          <p:nvPr/>
+        </p:nvSpPr>
+        <p:spPr>
+          <a:xfrm>
+            <a:off x="912940" y="2542022"/>
+            <a:ext cx="9032439" cy="707886"/>
+          </a:xfrm>
+          <a:prstGeom prst="rect">
+            <a:avLst/>
+          </a:prstGeom>
+          <a:noFill/>
+        </p:spPr>
+        <p:txBody>
+          <a:bodyPr wrap="square" rtlCol="0">
+            <a:spAutoFit/>
+          </a:bodyPr>
+          <a:lstStyle/>
+          <a:p>
+            <a:r>
+              <a:rPr lang="pt-BR" sz="4000" b="1" dirty="0">
+                <a:solidFill>
+                  <a:schemeClr val="bg1"/>
+                </a:solidFill>
+              </a:rPr>
+              <a:t>Mapeando valores de objetos</a:t>
+            </a:r>
+            <a:endParaRPr lang="pt-BR" sz="4000" b="1" i="1" dirty="0">
+              <a:solidFill>
+                <a:srgbClr val="FFFF00"/>
+              </a:solidFill>
+            </a:endParaRPr>
+          </a:p>
+        </p:txBody>
+      </p:sp>
+      <p:sp>
+        <p:nvSpPr>
+          <p:cNvPr id="7" name="CaixaDeTexto 6">
+            <a:extLst>
+              <a:ext uri="{FF2B5EF4-FFF2-40B4-BE49-F238E27FC236}">
+                <a16:creationId xmlns:a16="http://schemas.microsoft.com/office/drawing/2014/main" id="{263AFBE4-511B-4245-8086-8863013B255F}"/>
+              </a:ext>
+            </a:extLst>
+          </p:cNvPr>
+          <p:cNvSpPr txBox="1"/>
+          <p:nvPr/>
+        </p:nvSpPr>
+        <p:spPr>
+          <a:xfrm>
+            <a:off x="912939" y="3247811"/>
+            <a:ext cx="9032439" cy="707886"/>
+          </a:xfrm>
+          <a:prstGeom prst="rect">
+            <a:avLst/>
+          </a:prstGeom>
+          <a:noFill/>
+        </p:spPr>
+        <p:txBody>
+          <a:bodyPr wrap="square" rtlCol="0">
+            <a:spAutoFit/>
+          </a:bodyPr>
+          <a:lstStyle/>
+          <a:p>
+            <a:r>
+              <a:rPr lang="pt-BR" sz="4000" b="1" dirty="0">
+                <a:solidFill>
+                  <a:schemeClr val="bg1"/>
+                </a:solidFill>
+              </a:rPr>
+              <a:t>Mapeando 1 para muitos</a:t>
+            </a:r>
+            <a:endParaRPr lang="pt-BR" sz="4000" b="1" dirty="0">
+              <a:solidFill>
+                <a:srgbClr val="FFFF00"/>
+              </a:solidFill>
+            </a:endParaRPr>
+          </a:p>
+        </p:txBody>
+      </p:sp>
     </p:spTree>
     <p:extLst>
       <p:ext uri="{BB962C8B-B14F-4D97-AF65-F5344CB8AC3E}">
-        <p14:creationId xmlns:p14="http://schemas.microsoft.com/office/powerpoint/2010/main" val="3328350699"/>
+        <p14:creationId xmlns:p14="http://schemas.microsoft.com/office/powerpoint/2010/main" val="1809906541"/>
       </p:ext>
     </p:extLst>
   </p:cSld>
@@ -20653,16 +20822,13 @@
                   <a:schemeClr val="bg1"/>
                 </a:solidFill>
               </a:rPr>
-              <a:t>Exemplos com </a:t>
-            </a:r>
-            <a:r>
-              <a:rPr lang="pt-BR" sz="5400" b="1" dirty="0">
-                <a:solidFill>
-                  <a:srgbClr val="FFFF00"/>
-                </a:solidFill>
-              </a:rPr>
-              <a:t>EF-CORE (3.x)</a:t>
-            </a:r>
+              <a:t>Exemplos</a:t>
+            </a:r>
+            <a:endParaRPr lang="pt-BR" sz="5400" b="1" dirty="0">
+              <a:solidFill>
+                <a:srgbClr val="FFFF00"/>
+              </a:solidFill>
+            </a:endParaRPr>
           </a:p>
         </p:txBody>
       </p:sp>
@@ -20830,10 +20996,98 @@
           </a:p>
         </p:txBody>
       </p:sp>
+      <p:sp>
+        <p:nvSpPr>
+          <p:cNvPr id="7" name="CaixaDeTexto 6">
+            <a:extLst>
+              <a:ext uri="{FF2B5EF4-FFF2-40B4-BE49-F238E27FC236}">
+                <a16:creationId xmlns:a16="http://schemas.microsoft.com/office/drawing/2014/main" id="{263AFBE4-511B-4245-8086-8863013B255F}"/>
+              </a:ext>
+            </a:extLst>
+          </p:cNvPr>
+          <p:cNvSpPr txBox="1"/>
+          <p:nvPr/>
+        </p:nvSpPr>
+        <p:spPr>
+          <a:xfrm>
+            <a:off x="912939" y="3247811"/>
+            <a:ext cx="9032439" cy="707886"/>
+          </a:xfrm>
+          <a:prstGeom prst="rect">
+            <a:avLst/>
+          </a:prstGeom>
+          <a:noFill/>
+        </p:spPr>
+        <p:txBody>
+          <a:bodyPr wrap="square" rtlCol="0">
+            <a:spAutoFit/>
+          </a:bodyPr>
+          <a:lstStyle/>
+          <a:p>
+            <a:r>
+              <a:rPr lang="pt-BR" sz="4000" b="1" dirty="0">
+                <a:solidFill>
+                  <a:schemeClr val="bg1"/>
+                </a:solidFill>
+              </a:rPr>
+              <a:t>Mapeando 1 para muitos</a:t>
+            </a:r>
+            <a:endParaRPr lang="pt-BR" sz="4000" b="1" dirty="0">
+              <a:solidFill>
+                <a:srgbClr val="FFFF00"/>
+              </a:solidFill>
+            </a:endParaRPr>
+          </a:p>
+        </p:txBody>
+      </p:sp>
+      <p:sp>
+        <p:nvSpPr>
+          <p:cNvPr id="8" name="CaixaDeTexto 7">
+            <a:extLst>
+              <a:ext uri="{FF2B5EF4-FFF2-40B4-BE49-F238E27FC236}">
+                <a16:creationId xmlns:a16="http://schemas.microsoft.com/office/drawing/2014/main" id="{5E3D448B-41E7-4D2D-B61C-57855A6C6332}"/>
+              </a:ext>
+            </a:extLst>
+          </p:cNvPr>
+          <p:cNvSpPr txBox="1"/>
+          <p:nvPr/>
+        </p:nvSpPr>
+        <p:spPr>
+          <a:xfrm>
+            <a:off x="912939" y="3955697"/>
+            <a:ext cx="9032439" cy="707886"/>
+          </a:xfrm>
+          <a:prstGeom prst="rect">
+            <a:avLst/>
+          </a:prstGeom>
+          <a:noFill/>
+        </p:spPr>
+        <p:txBody>
+          <a:bodyPr wrap="square" rtlCol="0">
+            <a:spAutoFit/>
+          </a:bodyPr>
+          <a:lstStyle/>
+          <a:p>
+            <a:r>
+              <a:rPr lang="pt-BR" sz="4000" b="1" dirty="0">
+                <a:solidFill>
+                  <a:schemeClr val="bg1"/>
+                </a:solidFill>
+              </a:rPr>
+              <a:t>Salvando agregados</a:t>
+            </a:r>
+            <a:endParaRPr lang="pt-BR" sz="4000" b="1" dirty="0">
+              <a:solidFill>
+                <a:srgbClr val="FFFF00"/>
+              </a:solidFill>
+            </a:endParaRPr>
+          </a:p>
+        </p:txBody>
+      </p:sp>
     </p:spTree>
     <p:extLst>
       <p:ext uri="{BB962C8B-B14F-4D97-AF65-F5344CB8AC3E}">
-        <p14:creationId xmlns:p14="http://schemas.microsoft.com/office/powerpoint/2010/main" val="1727149459"/>
+        <p14:creationId xmlns:p14="http://schemas.microsoft.com/office/powerpoint/2010/main" val="784738224"/>
       </p:ext>
     </p:extLst>
   </p:cSld>
@@ -20929,16 +21183,13 @@
                   <a:schemeClr val="bg1"/>
                 </a:solidFill>
               </a:rPr>
-              <a:t>Exemplos com </a:t>
-            </a:r>
-            <a:r>
-              <a:rPr lang="pt-BR" sz="5400" b="1" dirty="0">
-                <a:solidFill>
-                  <a:srgbClr val="FFFF00"/>
-                </a:solidFill>
-              </a:rPr>
-              <a:t>EF-CORE (3.x)</a:t>
-            </a:r>
+              <a:t>Exemplos</a:t>
+            </a:r>
+            <a:endParaRPr lang="pt-BR" sz="5400" b="1" dirty="0">
+              <a:solidFill>
+                <a:srgbClr val="FFFF00"/>
+              </a:solidFill>
+            </a:endParaRPr>
           </a:p>
         </p:txBody>
       </p:sp>
@@ -21150,10 +21401,98 @@
           </a:p>
         </p:txBody>
       </p:sp>
+      <p:sp>
+        <p:nvSpPr>
+          <p:cNvPr id="8" name="CaixaDeTexto 7">
+            <a:extLst>
+              <a:ext uri="{FF2B5EF4-FFF2-40B4-BE49-F238E27FC236}">
+                <a16:creationId xmlns:a16="http://schemas.microsoft.com/office/drawing/2014/main" id="{5E3D448B-41E7-4D2D-B61C-57855A6C6332}"/>
+              </a:ext>
+            </a:extLst>
+          </p:cNvPr>
+          <p:cNvSpPr txBox="1"/>
+          <p:nvPr/>
+        </p:nvSpPr>
+        <p:spPr>
+          <a:xfrm>
+            <a:off x="912939" y="3955697"/>
+            <a:ext cx="9032439" cy="707886"/>
+          </a:xfrm>
+          <a:prstGeom prst="rect">
+            <a:avLst/>
+          </a:prstGeom>
+          <a:noFill/>
+        </p:spPr>
+        <p:txBody>
+          <a:bodyPr wrap="square" rtlCol="0">
+            <a:spAutoFit/>
+          </a:bodyPr>
+          <a:lstStyle/>
+          <a:p>
+            <a:r>
+              <a:rPr lang="pt-BR" sz="4000" b="1" dirty="0">
+                <a:solidFill>
+                  <a:schemeClr val="bg1"/>
+                </a:solidFill>
+              </a:rPr>
+              <a:t>Salvando agregados</a:t>
+            </a:r>
+            <a:endParaRPr lang="pt-BR" sz="4000" b="1" dirty="0">
+              <a:solidFill>
+                <a:srgbClr val="FFFF00"/>
+              </a:solidFill>
+            </a:endParaRPr>
+          </a:p>
+        </p:txBody>
+      </p:sp>
+      <p:sp>
+        <p:nvSpPr>
+          <p:cNvPr id="9" name="CaixaDeTexto 8">
+            <a:extLst>
+              <a:ext uri="{FF2B5EF4-FFF2-40B4-BE49-F238E27FC236}">
+                <a16:creationId xmlns:a16="http://schemas.microsoft.com/office/drawing/2014/main" id="{3E26651E-7358-420C-81A3-25E2521A26CF}"/>
+              </a:ext>
+            </a:extLst>
+          </p:cNvPr>
+          <p:cNvSpPr txBox="1"/>
+          <p:nvPr/>
+        </p:nvSpPr>
+        <p:spPr>
+          <a:xfrm>
+            <a:off x="912939" y="4661486"/>
+            <a:ext cx="9032439" cy="707886"/>
+          </a:xfrm>
+          <a:prstGeom prst="rect">
+            <a:avLst/>
+          </a:prstGeom>
+          <a:noFill/>
+        </p:spPr>
+        <p:txBody>
+          <a:bodyPr wrap="square" rtlCol="0">
+            <a:spAutoFit/>
+          </a:bodyPr>
+          <a:lstStyle/>
+          <a:p>
+            <a:r>
+              <a:rPr lang="pt-BR" sz="4000" b="1" dirty="0">
+                <a:solidFill>
+                  <a:schemeClr val="bg1"/>
+                </a:solidFill>
+              </a:rPr>
+              <a:t>Resiliência</a:t>
+            </a:r>
+            <a:endParaRPr lang="pt-BR" sz="4000" b="1" dirty="0">
+              <a:solidFill>
+                <a:srgbClr val="FFFF00"/>
+              </a:solidFill>
+            </a:endParaRPr>
+          </a:p>
+        </p:txBody>
+      </p:sp>
     </p:spTree>
     <p:extLst>
       <p:ext uri="{BB962C8B-B14F-4D97-AF65-F5344CB8AC3E}">
-        <p14:creationId xmlns:p14="http://schemas.microsoft.com/office/powerpoint/2010/main" val="1809906541"/>
+        <p14:creationId xmlns:p14="http://schemas.microsoft.com/office/powerpoint/2010/main" val="3920328239"/>
       </p:ext>
     </p:extLst>
   </p:cSld>
@@ -21249,16 +21588,13 @@
                   <a:schemeClr val="bg1"/>
                 </a:solidFill>
               </a:rPr>
-              <a:t>Exemplos com </a:t>
-            </a:r>
-            <a:r>
-              <a:rPr lang="pt-BR" sz="5400" b="1" dirty="0">
-                <a:solidFill>
-                  <a:srgbClr val="FFFF00"/>
-                </a:solidFill>
-              </a:rPr>
-              <a:t>EF-CORE (3.x)</a:t>
-            </a:r>
+              <a:t>Exemplos</a:t>
+            </a:r>
+            <a:endParaRPr lang="pt-BR" sz="5400" b="1" dirty="0">
+              <a:solidFill>
+                <a:srgbClr val="FFFF00"/>
+              </a:solidFill>
+            </a:endParaRPr>
           </a:p>
         </p:txBody>
       </p:sp>
@@ -21514,10 +21850,106 @@
           </a:p>
         </p:txBody>
       </p:sp>
+      <p:sp>
+        <p:nvSpPr>
+          <p:cNvPr id="9" name="CaixaDeTexto 8">
+            <a:extLst>
+              <a:ext uri="{FF2B5EF4-FFF2-40B4-BE49-F238E27FC236}">
+                <a16:creationId xmlns:a16="http://schemas.microsoft.com/office/drawing/2014/main" id="{3E26651E-7358-420C-81A3-25E2521A26CF}"/>
+              </a:ext>
+            </a:extLst>
+          </p:cNvPr>
+          <p:cNvSpPr txBox="1"/>
+          <p:nvPr/>
+        </p:nvSpPr>
+        <p:spPr>
+          <a:xfrm>
+            <a:off x="912939" y="4661486"/>
+            <a:ext cx="9032439" cy="707886"/>
+          </a:xfrm>
+          <a:prstGeom prst="rect">
+            <a:avLst/>
+          </a:prstGeom>
+          <a:noFill/>
+        </p:spPr>
+        <p:txBody>
+          <a:bodyPr wrap="square" rtlCol="0">
+            <a:spAutoFit/>
+          </a:bodyPr>
+          <a:lstStyle/>
+          <a:p>
+            <a:r>
+              <a:rPr lang="pt-BR" sz="4000" b="1" dirty="0">
+                <a:solidFill>
+                  <a:schemeClr val="bg1"/>
+                </a:solidFill>
+              </a:rPr>
+              <a:t>Resiliência</a:t>
+            </a:r>
+            <a:endParaRPr lang="pt-BR" sz="4000" b="1" dirty="0">
+              <a:solidFill>
+                <a:srgbClr val="FFFF00"/>
+              </a:solidFill>
+            </a:endParaRPr>
+          </a:p>
+        </p:txBody>
+      </p:sp>
+      <p:sp>
+        <p:nvSpPr>
+          <p:cNvPr id="10" name="CaixaDeTexto 9">
+            <a:extLst>
+              <a:ext uri="{FF2B5EF4-FFF2-40B4-BE49-F238E27FC236}">
+                <a16:creationId xmlns:a16="http://schemas.microsoft.com/office/drawing/2014/main" id="{E1774BE8-3242-47D1-B824-7CA2CF7C9E39}"/>
+              </a:ext>
+            </a:extLst>
+          </p:cNvPr>
+          <p:cNvSpPr txBox="1"/>
+          <p:nvPr/>
+        </p:nvSpPr>
+        <p:spPr>
+          <a:xfrm>
+            <a:off x="912939" y="5367275"/>
+            <a:ext cx="9032439" cy="707886"/>
+          </a:xfrm>
+          <a:prstGeom prst="rect">
+            <a:avLst/>
+          </a:prstGeom>
+          <a:noFill/>
+        </p:spPr>
+        <p:txBody>
+          <a:bodyPr wrap="square" rtlCol="0">
+            <a:spAutoFit/>
+          </a:bodyPr>
+          <a:lstStyle/>
+          <a:p>
+            <a:r>
+              <a:rPr lang="pt-BR" sz="4000" b="1" dirty="0">
+                <a:solidFill>
+                  <a:schemeClr val="bg1"/>
+                </a:solidFill>
+              </a:rPr>
+              <a:t>Trabalhando com </a:t>
+            </a:r>
+            <a:r>
+              <a:rPr lang="pt-BR" sz="4000" b="1" i="1" dirty="0" err="1">
+                <a:solidFill>
+                  <a:schemeClr val="bg1"/>
+                </a:solidFill>
+              </a:rPr>
+              <a:t>views</a:t>
+            </a:r>
+            <a:endParaRPr lang="pt-BR" sz="4000" b="1" i="1" dirty="0">
+              <a:solidFill>
+                <a:srgbClr val="FFFF00"/>
+              </a:solidFill>
+            </a:endParaRPr>
+          </a:p>
+        </p:txBody>
+      </p:sp>
     </p:spTree>
     <p:extLst>
       <p:ext uri="{BB962C8B-B14F-4D97-AF65-F5344CB8AC3E}">
-        <p14:creationId xmlns:p14="http://schemas.microsoft.com/office/powerpoint/2010/main" val="784738224"/>
+        <p14:creationId xmlns:p14="http://schemas.microsoft.com/office/powerpoint/2010/main" val="3359592067"/>
       </p:ext>
     </p:extLst>
   </p:cSld>
@@ -21613,16 +22045,13 @@
                   <a:schemeClr val="bg1"/>
                 </a:solidFill>
               </a:rPr>
-              <a:t>Exemplos com </a:t>
-            </a:r>
-            <a:r>
-              <a:rPr lang="pt-BR" sz="5400" b="1" dirty="0">
-                <a:solidFill>
-                  <a:srgbClr val="FFFF00"/>
-                </a:solidFill>
-              </a:rPr>
-              <a:t>EF-CORE (3.x)</a:t>
-            </a:r>
+              <a:t>Exemplos</a:t>
+            </a:r>
+            <a:endParaRPr lang="pt-BR" sz="5400" b="1" dirty="0">
+              <a:solidFill>
+                <a:srgbClr val="FFFF00"/>
+              </a:solidFill>
+            </a:endParaRPr>
           </a:p>
         </p:txBody>
       </p:sp>
@@ -21922,10 +22351,106 @@
           </a:p>
         </p:txBody>
       </p:sp>
+      <p:sp>
+        <p:nvSpPr>
+          <p:cNvPr id="10" name="CaixaDeTexto 9">
+            <a:extLst>
+              <a:ext uri="{FF2B5EF4-FFF2-40B4-BE49-F238E27FC236}">
+                <a16:creationId xmlns:a16="http://schemas.microsoft.com/office/drawing/2014/main" id="{E1774BE8-3242-47D1-B824-7CA2CF7C9E39}"/>
+              </a:ext>
+            </a:extLst>
+          </p:cNvPr>
+          <p:cNvSpPr txBox="1"/>
+          <p:nvPr/>
+        </p:nvSpPr>
+        <p:spPr>
+          <a:xfrm>
+            <a:off x="912939" y="5367275"/>
+            <a:ext cx="9032439" cy="707886"/>
+          </a:xfrm>
+          <a:prstGeom prst="rect">
+            <a:avLst/>
+          </a:prstGeom>
+          <a:noFill/>
+        </p:spPr>
+        <p:txBody>
+          <a:bodyPr wrap="square" rtlCol="0">
+            <a:spAutoFit/>
+          </a:bodyPr>
+          <a:lstStyle/>
+          <a:p>
+            <a:r>
+              <a:rPr lang="pt-BR" sz="4000" b="1" dirty="0">
+                <a:solidFill>
+                  <a:schemeClr val="bg1"/>
+                </a:solidFill>
+              </a:rPr>
+              <a:t>Trabalhando com </a:t>
+            </a:r>
+            <a:r>
+              <a:rPr lang="pt-BR" sz="4000" b="1" i="1" dirty="0" err="1">
+                <a:solidFill>
+                  <a:schemeClr val="bg1"/>
+                </a:solidFill>
+              </a:rPr>
+              <a:t>views</a:t>
+            </a:r>
+            <a:endParaRPr lang="pt-BR" sz="4000" b="1" i="1" dirty="0">
+              <a:solidFill>
+                <a:srgbClr val="FFFF00"/>
+              </a:solidFill>
+            </a:endParaRPr>
+          </a:p>
+        </p:txBody>
+      </p:sp>
+      <p:sp>
+        <p:nvSpPr>
+          <p:cNvPr id="11" name="CaixaDeTexto 10">
+            <a:extLst>
+              <a:ext uri="{FF2B5EF4-FFF2-40B4-BE49-F238E27FC236}">
+                <a16:creationId xmlns:a16="http://schemas.microsoft.com/office/drawing/2014/main" id="{05C4128A-D2FB-485D-A98C-CEE766B3DB99}"/>
+              </a:ext>
+            </a:extLst>
+          </p:cNvPr>
+          <p:cNvSpPr txBox="1"/>
+          <p:nvPr/>
+        </p:nvSpPr>
+        <p:spPr>
+          <a:xfrm>
+            <a:off x="912939" y="6073064"/>
+            <a:ext cx="9032439" cy="707886"/>
+          </a:xfrm>
+          <a:prstGeom prst="rect">
+            <a:avLst/>
+          </a:prstGeom>
+          <a:noFill/>
+        </p:spPr>
+        <p:txBody>
+          <a:bodyPr wrap="square" rtlCol="0">
+            <a:spAutoFit/>
+          </a:bodyPr>
+          <a:lstStyle/>
+          <a:p>
+            <a:r>
+              <a:rPr lang="pt-BR" sz="4000" b="1" dirty="0" err="1">
+                <a:solidFill>
+                  <a:schemeClr val="bg1"/>
+                </a:solidFill>
+              </a:rPr>
+              <a:t>Migrations</a:t>
+            </a:r>
+            <a:endParaRPr lang="pt-BR" sz="4000" b="1" i="1" dirty="0">
+              <a:solidFill>
+                <a:srgbClr val="FFFF00"/>
+              </a:solidFill>
+            </a:endParaRPr>
+          </a:p>
+        </p:txBody>
+      </p:sp>
     </p:spTree>
     <p:extLst>
       <p:ext uri="{BB962C8B-B14F-4D97-AF65-F5344CB8AC3E}">
-        <p14:creationId xmlns:p14="http://schemas.microsoft.com/office/powerpoint/2010/main" val="3920328239"/>
+        <p14:creationId xmlns:p14="http://schemas.microsoft.com/office/powerpoint/2010/main" val="1721830217"/>
       </p:ext>
     </p:extLst>
   </p:cSld>
@@ -21957,7 +22482,7 @@
           <p:cNvPr id="2" name="Espaço Reservado para Número de Slide 1">
             <a:extLst>
               <a:ext uri="{FF2B5EF4-FFF2-40B4-BE49-F238E27FC236}">
-                <a16:creationId xmlns:a16="http://schemas.microsoft.com/office/drawing/2014/main" id="{8A0E4171-3F15-4646-BC8F-80F036785803}"/>
+                <a16:creationId xmlns:a16="http://schemas.microsoft.com/office/drawing/2014/main" id="{4787AC8E-126A-4345-9530-51CF70E56214}"/>
               </a:ext>
             </a:extLst>
           </p:cNvPr>
@@ -21982,466 +22507,6 @@
               <a:rPr lang="pt-BR" b="1" i="1" noProof="0" smtClean="0"/>
               <a:pPr rtl="0"/>
               <a:t>16</a:t>
-            </a:fld>
-            <a:endParaRPr lang="pt-BR" b="1" i="1" noProof="0" dirty="0"/>
-          </a:p>
-        </p:txBody>
-      </p:sp>
-      <p:sp>
-        <p:nvSpPr>
-          <p:cNvPr id="3" name="CaixaDeTexto 2">
-            <a:extLst>
-              <a:ext uri="{FF2B5EF4-FFF2-40B4-BE49-F238E27FC236}">
-                <a16:creationId xmlns:a16="http://schemas.microsoft.com/office/drawing/2014/main" id="{43AE7DB6-EA95-4FD5-8D91-3C3AAB36A487}"/>
-              </a:ext>
-            </a:extLst>
-          </p:cNvPr>
-          <p:cNvSpPr txBox="1"/>
-          <p:nvPr/>
-        </p:nvSpPr>
-        <p:spPr>
-          <a:xfrm>
-            <a:off x="72643" y="202920"/>
-            <a:ext cx="9032439" cy="923330"/>
-          </a:xfrm>
-          <a:prstGeom prst="rect">
-            <a:avLst/>
-          </a:prstGeom>
-          <a:noFill/>
-        </p:spPr>
-        <p:txBody>
-          <a:bodyPr wrap="square" rtlCol="0">
-            <a:spAutoFit/>
-          </a:bodyPr>
-          <a:lstStyle/>
-          <a:p>
-            <a:r>
-              <a:rPr lang="pt-BR" sz="5400" b="1" dirty="0">
-                <a:solidFill>
-                  <a:schemeClr val="bg1"/>
-                </a:solidFill>
-              </a:rPr>
-              <a:t>Exemplos com </a:t>
-            </a:r>
-            <a:r>
-              <a:rPr lang="pt-BR" sz="5400" b="1" dirty="0">
-                <a:solidFill>
-                  <a:srgbClr val="FFFF00"/>
-                </a:solidFill>
-              </a:rPr>
-              <a:t>EF-CORE (3.x)</a:t>
-            </a:r>
-          </a:p>
-        </p:txBody>
-      </p:sp>
-      <p:sp>
-        <p:nvSpPr>
-          <p:cNvPr id="4" name="CaixaDeTexto 3">
-            <a:extLst>
-              <a:ext uri="{FF2B5EF4-FFF2-40B4-BE49-F238E27FC236}">
-                <a16:creationId xmlns:a16="http://schemas.microsoft.com/office/drawing/2014/main" id="{AF2EBECC-552C-4164-853C-856663C5F5B4}"/>
-              </a:ext>
-            </a:extLst>
-          </p:cNvPr>
-          <p:cNvSpPr txBox="1"/>
-          <p:nvPr/>
-        </p:nvSpPr>
-        <p:spPr>
-          <a:xfrm>
-            <a:off x="912941" y="1126250"/>
-            <a:ext cx="9032439" cy="707886"/>
-          </a:xfrm>
-          <a:prstGeom prst="rect">
-            <a:avLst/>
-          </a:prstGeom>
-          <a:noFill/>
-        </p:spPr>
-        <p:txBody>
-          <a:bodyPr wrap="square" rtlCol="0">
-            <a:spAutoFit/>
-          </a:bodyPr>
-          <a:lstStyle/>
-          <a:p>
-            <a:r>
-              <a:rPr lang="pt-BR" sz="4000" b="1" dirty="0">
-                <a:solidFill>
-                  <a:schemeClr val="bg1"/>
-                </a:solidFill>
-              </a:rPr>
-              <a:t>Repositórios e </a:t>
-            </a:r>
-            <a:r>
-              <a:rPr lang="pt-BR" sz="4000" b="1" i="1" dirty="0">
-                <a:solidFill>
-                  <a:schemeClr val="bg1"/>
-                </a:solidFill>
-              </a:rPr>
-              <a:t>Unit </a:t>
-            </a:r>
-            <a:r>
-              <a:rPr lang="pt-BR" sz="4000" b="1" i="1" dirty="0" err="1">
-                <a:solidFill>
-                  <a:schemeClr val="bg1"/>
-                </a:solidFill>
-              </a:rPr>
-              <a:t>of</a:t>
-            </a:r>
-            <a:r>
-              <a:rPr lang="pt-BR" sz="4000" b="1" i="1" dirty="0">
-                <a:solidFill>
-                  <a:schemeClr val="bg1"/>
-                </a:solidFill>
-              </a:rPr>
-              <a:t> </a:t>
-            </a:r>
-            <a:r>
-              <a:rPr lang="pt-BR" sz="4000" b="1" i="1" dirty="0" err="1">
-                <a:solidFill>
-                  <a:schemeClr val="bg1"/>
-                </a:solidFill>
-              </a:rPr>
-              <a:t>Work</a:t>
-            </a:r>
-            <a:endParaRPr lang="pt-BR" sz="4000" b="1" i="1" dirty="0">
-              <a:solidFill>
-                <a:srgbClr val="FFFF00"/>
-              </a:solidFill>
-            </a:endParaRPr>
-          </a:p>
-        </p:txBody>
-      </p:sp>
-      <p:sp>
-        <p:nvSpPr>
-          <p:cNvPr id="5" name="CaixaDeTexto 4">
-            <a:extLst>
-              <a:ext uri="{FF2B5EF4-FFF2-40B4-BE49-F238E27FC236}">
-                <a16:creationId xmlns:a16="http://schemas.microsoft.com/office/drawing/2014/main" id="{3F6974E5-06E7-4863-AC37-91A20DB741AC}"/>
-              </a:ext>
-            </a:extLst>
-          </p:cNvPr>
-          <p:cNvSpPr txBox="1"/>
-          <p:nvPr/>
-        </p:nvSpPr>
-        <p:spPr>
-          <a:xfrm>
-            <a:off x="912940" y="1834136"/>
-            <a:ext cx="9032439" cy="707886"/>
-          </a:xfrm>
-          <a:prstGeom prst="rect">
-            <a:avLst/>
-          </a:prstGeom>
-          <a:noFill/>
-        </p:spPr>
-        <p:txBody>
-          <a:bodyPr wrap="square" rtlCol="0">
-            <a:spAutoFit/>
-          </a:bodyPr>
-          <a:lstStyle/>
-          <a:p>
-            <a:r>
-              <a:rPr lang="pt-BR" sz="4000" b="1" dirty="0">
-                <a:solidFill>
-                  <a:schemeClr val="bg1"/>
-                </a:solidFill>
-              </a:rPr>
-              <a:t>Mapeando entidades</a:t>
-            </a:r>
-            <a:endParaRPr lang="pt-BR" sz="4000" b="1" i="1" dirty="0">
-              <a:solidFill>
-                <a:srgbClr val="FFFF00"/>
-              </a:solidFill>
-            </a:endParaRPr>
-          </a:p>
-        </p:txBody>
-      </p:sp>
-      <p:sp>
-        <p:nvSpPr>
-          <p:cNvPr id="6" name="CaixaDeTexto 5">
-            <a:extLst>
-              <a:ext uri="{FF2B5EF4-FFF2-40B4-BE49-F238E27FC236}">
-                <a16:creationId xmlns:a16="http://schemas.microsoft.com/office/drawing/2014/main" id="{22FA2AAE-7240-4636-A70A-D2F31F35B5A2}"/>
-              </a:ext>
-            </a:extLst>
-          </p:cNvPr>
-          <p:cNvSpPr txBox="1"/>
-          <p:nvPr/>
-        </p:nvSpPr>
-        <p:spPr>
-          <a:xfrm>
-            <a:off x="912940" y="2542022"/>
-            <a:ext cx="9032439" cy="707886"/>
-          </a:xfrm>
-          <a:prstGeom prst="rect">
-            <a:avLst/>
-          </a:prstGeom>
-          <a:noFill/>
-        </p:spPr>
-        <p:txBody>
-          <a:bodyPr wrap="square" rtlCol="0">
-            <a:spAutoFit/>
-          </a:bodyPr>
-          <a:lstStyle/>
-          <a:p>
-            <a:r>
-              <a:rPr lang="pt-BR" sz="4000" b="1" dirty="0">
-                <a:solidFill>
-                  <a:schemeClr val="bg1"/>
-                </a:solidFill>
-              </a:rPr>
-              <a:t>Mapeando valores de objetos</a:t>
-            </a:r>
-            <a:endParaRPr lang="pt-BR" sz="4000" b="1" i="1" dirty="0">
-              <a:solidFill>
-                <a:srgbClr val="FFFF00"/>
-              </a:solidFill>
-            </a:endParaRPr>
-          </a:p>
-        </p:txBody>
-      </p:sp>
-      <p:sp>
-        <p:nvSpPr>
-          <p:cNvPr id="7" name="CaixaDeTexto 6">
-            <a:extLst>
-              <a:ext uri="{FF2B5EF4-FFF2-40B4-BE49-F238E27FC236}">
-                <a16:creationId xmlns:a16="http://schemas.microsoft.com/office/drawing/2014/main" id="{263AFBE4-511B-4245-8086-8863013B255F}"/>
-              </a:ext>
-            </a:extLst>
-          </p:cNvPr>
-          <p:cNvSpPr txBox="1"/>
-          <p:nvPr/>
-        </p:nvSpPr>
-        <p:spPr>
-          <a:xfrm>
-            <a:off x="912939" y="3247811"/>
-            <a:ext cx="9032439" cy="707886"/>
-          </a:xfrm>
-          <a:prstGeom prst="rect">
-            <a:avLst/>
-          </a:prstGeom>
-          <a:noFill/>
-        </p:spPr>
-        <p:txBody>
-          <a:bodyPr wrap="square" rtlCol="0">
-            <a:spAutoFit/>
-          </a:bodyPr>
-          <a:lstStyle/>
-          <a:p>
-            <a:r>
-              <a:rPr lang="pt-BR" sz="4000" b="1" dirty="0">
-                <a:solidFill>
-                  <a:schemeClr val="bg1"/>
-                </a:solidFill>
-              </a:rPr>
-              <a:t>Mapeando 1 para muitos</a:t>
-            </a:r>
-            <a:endParaRPr lang="pt-BR" sz="4000" b="1" dirty="0">
-              <a:solidFill>
-                <a:srgbClr val="FFFF00"/>
-              </a:solidFill>
-            </a:endParaRPr>
-          </a:p>
-        </p:txBody>
-      </p:sp>
-      <p:sp>
-        <p:nvSpPr>
-          <p:cNvPr id="8" name="CaixaDeTexto 7">
-            <a:extLst>
-              <a:ext uri="{FF2B5EF4-FFF2-40B4-BE49-F238E27FC236}">
-                <a16:creationId xmlns:a16="http://schemas.microsoft.com/office/drawing/2014/main" id="{5E3D448B-41E7-4D2D-B61C-57855A6C6332}"/>
-              </a:ext>
-            </a:extLst>
-          </p:cNvPr>
-          <p:cNvSpPr txBox="1"/>
-          <p:nvPr/>
-        </p:nvSpPr>
-        <p:spPr>
-          <a:xfrm>
-            <a:off x="912939" y="3955697"/>
-            <a:ext cx="9032439" cy="707886"/>
-          </a:xfrm>
-          <a:prstGeom prst="rect">
-            <a:avLst/>
-          </a:prstGeom>
-          <a:noFill/>
-        </p:spPr>
-        <p:txBody>
-          <a:bodyPr wrap="square" rtlCol="0">
-            <a:spAutoFit/>
-          </a:bodyPr>
-          <a:lstStyle/>
-          <a:p>
-            <a:r>
-              <a:rPr lang="pt-BR" sz="4000" b="1" dirty="0">
-                <a:solidFill>
-                  <a:schemeClr val="bg1"/>
-                </a:solidFill>
-              </a:rPr>
-              <a:t>Salvando agregados</a:t>
-            </a:r>
-            <a:endParaRPr lang="pt-BR" sz="4000" b="1" dirty="0">
-              <a:solidFill>
-                <a:srgbClr val="FFFF00"/>
-              </a:solidFill>
-            </a:endParaRPr>
-          </a:p>
-        </p:txBody>
-      </p:sp>
-      <p:sp>
-        <p:nvSpPr>
-          <p:cNvPr id="9" name="CaixaDeTexto 8">
-            <a:extLst>
-              <a:ext uri="{FF2B5EF4-FFF2-40B4-BE49-F238E27FC236}">
-                <a16:creationId xmlns:a16="http://schemas.microsoft.com/office/drawing/2014/main" id="{3E26651E-7358-420C-81A3-25E2521A26CF}"/>
-              </a:ext>
-            </a:extLst>
-          </p:cNvPr>
-          <p:cNvSpPr txBox="1"/>
-          <p:nvPr/>
-        </p:nvSpPr>
-        <p:spPr>
-          <a:xfrm>
-            <a:off x="912939" y="4661486"/>
-            <a:ext cx="9032439" cy="707886"/>
-          </a:xfrm>
-          <a:prstGeom prst="rect">
-            <a:avLst/>
-          </a:prstGeom>
-          <a:noFill/>
-        </p:spPr>
-        <p:txBody>
-          <a:bodyPr wrap="square" rtlCol="0">
-            <a:spAutoFit/>
-          </a:bodyPr>
-          <a:lstStyle/>
-          <a:p>
-            <a:r>
-              <a:rPr lang="pt-BR" sz="4000" b="1" dirty="0">
-                <a:solidFill>
-                  <a:schemeClr val="bg1"/>
-                </a:solidFill>
-              </a:rPr>
-              <a:t>Resiliência</a:t>
-            </a:r>
-            <a:endParaRPr lang="pt-BR" sz="4000" b="1" dirty="0">
-              <a:solidFill>
-                <a:srgbClr val="FFFF00"/>
-              </a:solidFill>
-            </a:endParaRPr>
-          </a:p>
-        </p:txBody>
-      </p:sp>
-      <p:sp>
-        <p:nvSpPr>
-          <p:cNvPr id="10" name="CaixaDeTexto 9">
-            <a:extLst>
-              <a:ext uri="{FF2B5EF4-FFF2-40B4-BE49-F238E27FC236}">
-                <a16:creationId xmlns:a16="http://schemas.microsoft.com/office/drawing/2014/main" id="{E1774BE8-3242-47D1-B824-7CA2CF7C9E39}"/>
-              </a:ext>
-            </a:extLst>
-          </p:cNvPr>
-          <p:cNvSpPr txBox="1"/>
-          <p:nvPr/>
-        </p:nvSpPr>
-        <p:spPr>
-          <a:xfrm>
-            <a:off x="912939" y="5367275"/>
-            <a:ext cx="9032439" cy="707886"/>
-          </a:xfrm>
-          <a:prstGeom prst="rect">
-            <a:avLst/>
-          </a:prstGeom>
-          <a:noFill/>
-        </p:spPr>
-        <p:txBody>
-          <a:bodyPr wrap="square" rtlCol="0">
-            <a:spAutoFit/>
-          </a:bodyPr>
-          <a:lstStyle/>
-          <a:p>
-            <a:r>
-              <a:rPr lang="pt-BR" sz="4000" b="1" dirty="0">
-                <a:solidFill>
-                  <a:schemeClr val="bg1"/>
-                </a:solidFill>
-              </a:rPr>
-              <a:t>Trabalhando com </a:t>
-            </a:r>
-            <a:r>
-              <a:rPr lang="pt-BR" sz="4000" b="1" i="1" dirty="0" err="1">
-                <a:solidFill>
-                  <a:schemeClr val="bg1"/>
-                </a:solidFill>
-              </a:rPr>
-              <a:t>views</a:t>
-            </a:r>
-            <a:endParaRPr lang="pt-BR" sz="4000" b="1" i="1" dirty="0">
-              <a:solidFill>
-                <a:srgbClr val="FFFF00"/>
-              </a:solidFill>
-            </a:endParaRPr>
-          </a:p>
-        </p:txBody>
-      </p:sp>
-    </p:spTree>
-    <p:extLst>
-      <p:ext uri="{BB962C8B-B14F-4D97-AF65-F5344CB8AC3E}">
-        <p14:creationId xmlns:p14="http://schemas.microsoft.com/office/powerpoint/2010/main" val="3359592067"/>
-      </p:ext>
-    </p:extLst>
-  </p:cSld>
-  <p:clrMapOvr>
-    <a:masterClrMapping/>
-  </p:clrMapOvr>
-</p:sld>
-</file>
-
-<file path=ppt/slides/slide17.xml><?xml version="1.0" encoding="utf-8"?>
-<p:sld xmlns:a="http://schemas.openxmlformats.org/drawingml/2006/main" xmlns:r="http://schemas.openxmlformats.org/officeDocument/2006/relationships" xmlns:p="http://schemas.openxmlformats.org/presentationml/2006/main">
-  <p:cSld>
-    <p:spTree>
-      <p:nvGrpSpPr>
-        <p:cNvPr id="1" name=""/>
-        <p:cNvGrpSpPr/>
-        <p:nvPr/>
-      </p:nvGrpSpPr>
-      <p:grpSpPr>
-        <a:xfrm>
-          <a:off x="0" y="0"/>
-          <a:ext cx="0" cy="0"/>
-          <a:chOff x="0" y="0"/>
-          <a:chExt cx="0" cy="0"/>
-        </a:xfrm>
-      </p:grpSpPr>
-      <p:sp>
-        <p:nvSpPr>
-          <p:cNvPr id="2" name="Espaço Reservado para Número de Slide 1">
-            <a:extLst>
-              <a:ext uri="{FF2B5EF4-FFF2-40B4-BE49-F238E27FC236}">
-                <a16:creationId xmlns:a16="http://schemas.microsoft.com/office/drawing/2014/main" id="{4787AC8E-126A-4345-9530-51CF70E56214}"/>
-              </a:ext>
-            </a:extLst>
-          </p:cNvPr>
-          <p:cNvSpPr>
-            <a:spLocks noGrp="1"/>
-          </p:cNvSpPr>
-          <p:nvPr>
-            <p:ph type="sldNum" sz="quarter" idx="11"/>
-          </p:nvPr>
-        </p:nvSpPr>
-        <p:spPr/>
-        <p:txBody>
-          <a:bodyPr/>
-          <a:lstStyle/>
-          <a:p>
-            <a:pPr rtl="0"/>
-            <a:r>
-              <a:rPr lang="pt-BR" noProof="0"/>
-              <a:t>página </a:t>
-            </a:r>
-            <a:fld id="{19B51A1E-902D-48AF-9020-955120F399B6}" type="slidenum">
-              <a:rPr lang="pt-BR" b="1" i="1" noProof="0" smtClean="0"/>
-              <a:pPr rtl="0"/>
-              <a:t>17</a:t>
             </a:fld>
             <a:endParaRPr lang="pt-BR" b="1" i="1" noProof="0" dirty="0"/>
           </a:p>
@@ -22531,7 +22596,7 @@
 </p:sld>
 </file>
 
-<file path=ppt/slides/slide18.xml><?xml version="1.0" encoding="utf-8"?>
+<file path=ppt/slides/slide17.xml><?xml version="1.0" encoding="utf-8"?>
 <p:sld xmlns:a="http://schemas.openxmlformats.org/drawingml/2006/main" xmlns:r="http://schemas.openxmlformats.org/officeDocument/2006/relationships" xmlns:p="http://schemas.openxmlformats.org/presentationml/2006/main">
   <p:cSld>
     <p:spTree>
@@ -23797,7 +23862,7 @@
           <p:cNvPr id="2" name="Espaço Reservado para Número de Slide 1">
             <a:extLst>
               <a:ext uri="{FF2B5EF4-FFF2-40B4-BE49-F238E27FC236}">
-                <a16:creationId xmlns:a16="http://schemas.microsoft.com/office/drawing/2014/main" id="{E9B067C7-EE44-4F2C-A70E-9D531A971626}"/>
+                <a16:creationId xmlns:a16="http://schemas.microsoft.com/office/drawing/2014/main" id="{8A0E4171-3F15-4646-BC8F-80F036785803}"/>
               </a:ext>
             </a:extLst>
           </p:cNvPr>
@@ -23832,7 +23897,7 @@
           <p:cNvPr id="3" name="CaixaDeTexto 2">
             <a:extLst>
               <a:ext uri="{FF2B5EF4-FFF2-40B4-BE49-F238E27FC236}">
-                <a16:creationId xmlns:a16="http://schemas.microsoft.com/office/drawing/2014/main" id="{39523D93-EDC0-4A52-8CEB-5F4BDF20E43A}"/>
+                <a16:creationId xmlns:a16="http://schemas.microsoft.com/office/drawing/2014/main" id="{43AE7DB6-EA95-4FD5-8D91-3C3AAB36A487}"/>
               </a:ext>
             </a:extLst>
           </p:cNvPr>
@@ -23861,15 +23926,7 @@
                   <a:schemeClr val="bg1"/>
                 </a:solidFill>
               </a:rPr>
-              <a:t>Exemplos com </a:t>
-            </a:r>
-            <a:r>
-              <a:rPr lang="pt-BR" sz="5400" b="1" dirty="0" err="1">
-                <a:solidFill>
-                  <a:srgbClr val="FFFF00"/>
-                </a:solidFill>
-              </a:rPr>
-              <a:t>Dapper</a:t>
+              <a:t>Exemplos</a:t>
             </a:r>
             <a:endParaRPr lang="pt-BR" sz="5400" b="1" dirty="0">
               <a:solidFill>
@@ -23879,10 +23936,86 @@
           </a:p>
         </p:txBody>
       </p:sp>
+      <p:sp>
+        <p:nvSpPr>
+          <p:cNvPr id="4" name="CaixaDeTexto 3">
+            <a:extLst>
+              <a:ext uri="{FF2B5EF4-FFF2-40B4-BE49-F238E27FC236}">
+                <a16:creationId xmlns:a16="http://schemas.microsoft.com/office/drawing/2014/main" id="{AF2EBECC-552C-4164-853C-856663C5F5B4}"/>
+              </a:ext>
+            </a:extLst>
+          </p:cNvPr>
+          <p:cNvSpPr txBox="1"/>
+          <p:nvPr/>
+        </p:nvSpPr>
+        <p:spPr>
+          <a:xfrm>
+            <a:off x="912941" y="1126250"/>
+            <a:ext cx="9032439" cy="707886"/>
+          </a:xfrm>
+          <a:prstGeom prst="rect">
+            <a:avLst/>
+          </a:prstGeom>
+          <a:noFill/>
+        </p:spPr>
+        <p:txBody>
+          <a:bodyPr wrap="square" rtlCol="0">
+            <a:spAutoFit/>
+          </a:bodyPr>
+          <a:lstStyle/>
+          <a:p>
+            <a:r>
+              <a:rPr lang="pt-BR" sz="4000" b="1" dirty="0">
+                <a:solidFill>
+                  <a:schemeClr val="bg1"/>
+                </a:solidFill>
+              </a:rPr>
+              <a:t>Repositórios e </a:t>
+            </a:r>
+            <a:r>
+              <a:rPr lang="pt-BR" sz="4000" b="1" i="1" dirty="0">
+                <a:solidFill>
+                  <a:schemeClr val="bg1"/>
+                </a:solidFill>
+              </a:rPr>
+              <a:t>Unit </a:t>
+            </a:r>
+            <a:r>
+              <a:rPr lang="pt-BR" sz="4000" b="1" i="1" dirty="0" err="1">
+                <a:solidFill>
+                  <a:schemeClr val="bg1"/>
+                </a:solidFill>
+              </a:rPr>
+              <a:t>of</a:t>
+            </a:r>
+            <a:r>
+              <a:rPr lang="pt-BR" sz="4000" b="1" i="1" dirty="0">
+                <a:solidFill>
+                  <a:schemeClr val="bg1"/>
+                </a:solidFill>
+              </a:rPr>
+              <a:t> </a:t>
+            </a:r>
+            <a:r>
+              <a:rPr lang="pt-BR" sz="4000" b="1" i="1" dirty="0" err="1">
+                <a:solidFill>
+                  <a:schemeClr val="bg1"/>
+                </a:solidFill>
+              </a:rPr>
+              <a:t>Work</a:t>
+            </a:r>
+            <a:endParaRPr lang="pt-BR" sz="4000" b="1" i="1" dirty="0">
+              <a:solidFill>
+                <a:srgbClr val="FFFF00"/>
+              </a:solidFill>
+            </a:endParaRPr>
+          </a:p>
+        </p:txBody>
+      </p:sp>
     </p:spTree>
     <p:extLst>
       <p:ext uri="{BB962C8B-B14F-4D97-AF65-F5344CB8AC3E}">
-        <p14:creationId xmlns:p14="http://schemas.microsoft.com/office/powerpoint/2010/main" val="260347257"/>
+        <p14:creationId xmlns:p14="http://schemas.microsoft.com/office/powerpoint/2010/main" val="3125934658"/>
       </p:ext>
     </p:extLst>
   </p:cSld>
@@ -23978,23 +24111,140 @@
                   <a:schemeClr val="bg1"/>
                 </a:solidFill>
               </a:rPr>
-              <a:t>Exemplos com </a:t>
-            </a:r>
-            <a:r>
-              <a:rPr lang="pt-BR" sz="5400" b="1" dirty="0">
-                <a:solidFill>
-                  <a:srgbClr val="FFFF00"/>
+              <a:t>Exemplos</a:t>
+            </a:r>
+            <a:endParaRPr lang="pt-BR" sz="5400" b="1" dirty="0">
+              <a:solidFill>
+                <a:srgbClr val="FFFF00"/>
+              </a:solidFill>
+            </a:endParaRPr>
+          </a:p>
+        </p:txBody>
+      </p:sp>
+      <p:sp>
+        <p:nvSpPr>
+          <p:cNvPr id="4" name="CaixaDeTexto 3">
+            <a:extLst>
+              <a:ext uri="{FF2B5EF4-FFF2-40B4-BE49-F238E27FC236}">
+                <a16:creationId xmlns:a16="http://schemas.microsoft.com/office/drawing/2014/main" id="{AF2EBECC-552C-4164-853C-856663C5F5B4}"/>
+              </a:ext>
+            </a:extLst>
+          </p:cNvPr>
+          <p:cNvSpPr txBox="1"/>
+          <p:nvPr/>
+        </p:nvSpPr>
+        <p:spPr>
+          <a:xfrm>
+            <a:off x="912941" y="1126250"/>
+            <a:ext cx="9032439" cy="707886"/>
+          </a:xfrm>
+          <a:prstGeom prst="rect">
+            <a:avLst/>
+          </a:prstGeom>
+          <a:noFill/>
+        </p:spPr>
+        <p:txBody>
+          <a:bodyPr wrap="square" rtlCol="0">
+            <a:spAutoFit/>
+          </a:bodyPr>
+          <a:lstStyle/>
+          <a:p>
+            <a:r>
+              <a:rPr lang="pt-BR" sz="4000" b="1" dirty="0">
+                <a:solidFill>
+                  <a:schemeClr val="bg1"/>
                 </a:solidFill>
               </a:rPr>
-              <a:t>EF-CORE (3.x)</a:t>
-            </a:r>
+              <a:t>Repositórios e </a:t>
+            </a:r>
+            <a:r>
+              <a:rPr lang="pt-BR" sz="4000" b="1" i="1" dirty="0">
+                <a:solidFill>
+                  <a:schemeClr val="bg1"/>
+                </a:solidFill>
+              </a:rPr>
+              <a:t>Unit </a:t>
+            </a:r>
+            <a:r>
+              <a:rPr lang="pt-BR" sz="4000" b="1" i="1" dirty="0" err="1">
+                <a:solidFill>
+                  <a:schemeClr val="bg1"/>
+                </a:solidFill>
+              </a:rPr>
+              <a:t>of</a:t>
+            </a:r>
+            <a:r>
+              <a:rPr lang="pt-BR" sz="4000" b="1" i="1" dirty="0">
+                <a:solidFill>
+                  <a:schemeClr val="bg1"/>
+                </a:solidFill>
+              </a:rPr>
+              <a:t> </a:t>
+            </a:r>
+            <a:r>
+              <a:rPr lang="pt-BR" sz="4000" b="1" i="1" dirty="0" err="1">
+                <a:solidFill>
+                  <a:schemeClr val="bg1"/>
+                </a:solidFill>
+              </a:rPr>
+              <a:t>Work</a:t>
+            </a:r>
+            <a:endParaRPr lang="pt-BR" sz="4000" b="1" i="1" dirty="0">
+              <a:solidFill>
+                <a:srgbClr val="FFFF00"/>
+              </a:solidFill>
+            </a:endParaRPr>
+          </a:p>
+        </p:txBody>
+      </p:sp>
+      <p:sp>
+        <p:nvSpPr>
+          <p:cNvPr id="5" name="CaixaDeTexto 4">
+            <a:extLst>
+              <a:ext uri="{FF2B5EF4-FFF2-40B4-BE49-F238E27FC236}">
+                <a16:creationId xmlns:a16="http://schemas.microsoft.com/office/drawing/2014/main" id="{3F6974E5-06E7-4863-AC37-91A20DB741AC}"/>
+              </a:ext>
+            </a:extLst>
+          </p:cNvPr>
+          <p:cNvSpPr txBox="1"/>
+          <p:nvPr/>
+        </p:nvSpPr>
+        <p:spPr>
+          <a:xfrm>
+            <a:off x="912940" y="1834136"/>
+            <a:ext cx="9032439" cy="707886"/>
+          </a:xfrm>
+          <a:prstGeom prst="rect">
+            <a:avLst/>
+          </a:prstGeom>
+          <a:noFill/>
+        </p:spPr>
+        <p:txBody>
+          <a:bodyPr wrap="square" rtlCol="0">
+            <a:spAutoFit/>
+          </a:bodyPr>
+          <a:lstStyle/>
+          <a:p>
+            <a:r>
+              <a:rPr lang="pt-BR" sz="4000" b="1" dirty="0">
+                <a:solidFill>
+                  <a:schemeClr val="bg1"/>
+                </a:solidFill>
+              </a:rPr>
+              <a:t>Mapeando entidades</a:t>
+            </a:r>
+            <a:endParaRPr lang="pt-BR" sz="4000" b="1" i="1" dirty="0">
+              <a:solidFill>
+                <a:srgbClr val="FFFF00"/>
+              </a:solidFill>
+            </a:endParaRPr>
           </a:p>
         </p:txBody>
       </p:sp>
     </p:spTree>
     <p:extLst>
       <p:ext uri="{BB962C8B-B14F-4D97-AF65-F5344CB8AC3E}">
-        <p14:creationId xmlns:p14="http://schemas.microsoft.com/office/powerpoint/2010/main" val="3045605664"/>
+        <p14:creationId xmlns:p14="http://schemas.microsoft.com/office/powerpoint/2010/main" val="3328350699"/>
       </p:ext>
     </p:extLst>
   </p:cSld>
@@ -24901,6 +25151,15 @@
 </file>
 
 <file path=customXml/item1.xml><?xml version="1.0" encoding="utf-8"?>
+<?mso-contentType ?>
+<FormTemplates xmlns="http://schemas.microsoft.com/sharepoint/v3/contenttype/forms">
+  <Display>DocumentLibraryForm</Display>
+  <Edit>DocumentLibraryForm</Edit>
+  <New>DocumentLibraryForm</New>
+</FormTemplates>
+</file>
+
+<file path=customXml/item2.xml><?xml version="1.0" encoding="utf-8"?>
 <ct:contentTypeSchema xmlns:ct="http://schemas.microsoft.com/office/2006/metadata/contentType" xmlns:ma="http://schemas.microsoft.com/office/2006/metadata/properties/metaAttributes" ct:_="" ma:_="" ma:contentTypeName="Document" ma:contentTypeID="0x01010079F111ED35F8CC479449609E8A0923A6" ma:contentTypeVersion="10" ma:contentTypeDescription="Create a new document." ma:contentTypeScope="" ma:versionID="e39e7e9e36de66d473ce04bb4ab2dbb8">
   <xsd:schema xmlns:xsd="http://www.w3.org/2001/XMLSchema" xmlns:xs="http://www.w3.org/2001/XMLSchema" xmlns:p="http://schemas.microsoft.com/office/2006/metadata/properties" xmlns:ns2="71af3243-3dd4-4a8d-8c0d-dd76da1f02a5" xmlns:ns3="16c05727-aa75-4e4a-9b5f-8a80a1165891" targetNamespace="http://schemas.microsoft.com/office/2006/metadata/properties" ma:root="true" ma:fieldsID="19dc5994665da46609c24125788630d8" ns2:_="" ns3:_="">
     <xsd:import namespace="71af3243-3dd4-4a8d-8c0d-dd76da1f02a5"/>
@@ -25105,15 +25364,6 @@
 </ct:contentTypeSchema>
 </file>
 
-<file path=customXml/item2.xml><?xml version="1.0" encoding="utf-8"?>
-<?mso-contentType ?>
-<FormTemplates xmlns="http://schemas.microsoft.com/sharepoint/v3/contenttype/forms">
-  <Display>DocumentLibraryForm</Display>
-  <Edit>DocumentLibraryForm</Edit>
-  <New>DocumentLibraryForm</New>
-</FormTemplates>
-</file>
-
 <file path=customXml/item3.xml><?xml version="1.0" encoding="utf-8"?>
 <p:properties xmlns:p="http://schemas.microsoft.com/office/2006/metadata/properties" xmlns:xsi="http://www.w3.org/2001/XMLSchema-instance" xmlns:pc="http://schemas.microsoft.com/office/infopath/2007/PartnerControls">
   <documentManagement>
@@ -25123,6 +25373,14 @@
 </file>
 
 <file path=customXml/itemProps1.xml><?xml version="1.0" encoding="utf-8"?>
+<ds:datastoreItem xmlns:ds="http://schemas.openxmlformats.org/officeDocument/2006/customXml" ds:itemID="{80BB2B2B-C092-4034-8027-ED80E70B81A9}">
+  <ds:schemaRefs>
+    <ds:schemaRef ds:uri="http://schemas.microsoft.com/sharepoint/v3/contenttype/forms"/>
+  </ds:schemaRefs>
+</ds:datastoreItem>
+</file>
+
+<file path=customXml/itemProps2.xml><?xml version="1.0" encoding="utf-8"?>
 <ds:datastoreItem xmlns:ds="http://schemas.openxmlformats.org/officeDocument/2006/customXml" ds:itemID="{40BD0185-E894-43F5-A381-22FE8094B9A3}">
   <ds:schemaRefs>
     <ds:schemaRef ds:uri="http://schemas.microsoft.com/office/2006/metadata/contentType"/>
@@ -25141,14 +25399,6 @@
 </ds:datastoreItem>
 </file>
 
-<file path=customXml/itemProps2.xml><?xml version="1.0" encoding="utf-8"?>
-<ds:datastoreItem xmlns:ds="http://schemas.openxmlformats.org/officeDocument/2006/customXml" ds:itemID="{80BB2B2B-C092-4034-8027-ED80E70B81A9}">
-  <ds:schemaRefs>
-    <ds:schemaRef ds:uri="http://schemas.microsoft.com/sharepoint/v3/contenttype/forms"/>
-  </ds:schemaRefs>
-</ds:datastoreItem>
-</file>
-
 <file path=customXml/itemProps3.xml><?xml version="1.0" encoding="utf-8"?>
 <ds:datastoreItem xmlns:ds="http://schemas.openxmlformats.org/officeDocument/2006/customXml" ds:itemID="{9A2E6E59-6E17-40F8-B412-65DEC6629148}">
   <ds:schemaRefs>

</xml_diff>